<commit_message>
Programs of second lab
</commit_message>
<xml_diff>
--- a/lab practicals.pptx
+++ b/lab practicals.pptx
@@ -8,6 +8,7 @@
     <p:sldId id="256" r:id="rId2"/>
     <p:sldId id="257" r:id="rId3"/>
     <p:sldId id="258" r:id="rId4"/>
+    <p:sldId id="259" r:id="rId5"/>
   </p:sldIdLst>
   <p:sldSz cx="9144000" cy="6858000" type="screen4x3"/>
   <p:notesSz cx="6858000" cy="9144000"/>
@@ -106,6 +107,11 @@
       </a:defRPr>
     </a:lvl9pPr>
   </p:defaultTextStyle>
+  <p:extLst>
+    <p:ext uri="{EFAFB233-063F-42B5-8137-9DF3F51BA10A}">
+      <p15:sldGuideLst xmlns:p15="http://schemas.microsoft.com/office/powerpoint/2012/main"/>
+    </p:ext>
+  </p:extLst>
 </p:presentation>
 </file>
 
@@ -240,7 +246,7 @@
           <a:p>
             <a:fld id="{8B60302E-30E2-D841-94D8-D5B4ABBB1556}" type="datetimeFigureOut">
               <a:rPr lang="en-US" smtClean="0"/>
-              <a:t>8/12/18</a:t>
+              <a:t>8/19/18</a:t>
             </a:fld>
             <a:endParaRPr lang="en-US"/>
           </a:p>
@@ -405,7 +411,7 @@
           <a:p>
             <a:fld id="{8B60302E-30E2-D841-94D8-D5B4ABBB1556}" type="datetimeFigureOut">
               <a:rPr lang="en-US" smtClean="0"/>
-              <a:t>8/12/18</a:t>
+              <a:t>8/19/18</a:t>
             </a:fld>
             <a:endParaRPr lang="en-US"/>
           </a:p>
@@ -580,7 +586,7 @@
           <a:p>
             <a:fld id="{8B60302E-30E2-D841-94D8-D5B4ABBB1556}" type="datetimeFigureOut">
               <a:rPr lang="en-US" smtClean="0"/>
-              <a:t>8/12/18</a:t>
+              <a:t>8/19/18</a:t>
             </a:fld>
             <a:endParaRPr lang="en-US"/>
           </a:p>
@@ -745,7 +751,7 @@
           <a:p>
             <a:fld id="{8B60302E-30E2-D841-94D8-D5B4ABBB1556}" type="datetimeFigureOut">
               <a:rPr lang="en-US" smtClean="0"/>
-              <a:t>8/12/18</a:t>
+              <a:t>8/19/18</a:t>
             </a:fld>
             <a:endParaRPr lang="en-US"/>
           </a:p>
@@ -984,7 +990,7 @@
           <a:p>
             <a:fld id="{8B60302E-30E2-D841-94D8-D5B4ABBB1556}" type="datetimeFigureOut">
               <a:rPr lang="en-US" smtClean="0"/>
-              <a:t>8/12/18</a:t>
+              <a:t>8/19/18</a:t>
             </a:fld>
             <a:endParaRPr lang="en-US"/>
           </a:p>
@@ -1211,7 +1217,7 @@
           <a:p>
             <a:fld id="{8B60302E-30E2-D841-94D8-D5B4ABBB1556}" type="datetimeFigureOut">
               <a:rPr lang="en-US" smtClean="0"/>
-              <a:t>8/12/18</a:t>
+              <a:t>8/19/18</a:t>
             </a:fld>
             <a:endParaRPr lang="en-US"/>
           </a:p>
@@ -1573,7 +1579,7 @@
           <a:p>
             <a:fld id="{8B60302E-30E2-D841-94D8-D5B4ABBB1556}" type="datetimeFigureOut">
               <a:rPr lang="en-US" smtClean="0"/>
-              <a:t>8/12/18</a:t>
+              <a:t>8/19/18</a:t>
             </a:fld>
             <a:endParaRPr lang="en-US"/>
           </a:p>
@@ -1686,7 +1692,7 @@
           <a:p>
             <a:fld id="{8B60302E-30E2-D841-94D8-D5B4ABBB1556}" type="datetimeFigureOut">
               <a:rPr lang="en-US" smtClean="0"/>
-              <a:t>8/12/18</a:t>
+              <a:t>8/19/18</a:t>
             </a:fld>
             <a:endParaRPr lang="en-US"/>
           </a:p>
@@ -1776,7 +1782,7 @@
           <a:p>
             <a:fld id="{8B60302E-30E2-D841-94D8-D5B4ABBB1556}" type="datetimeFigureOut">
               <a:rPr lang="en-US" smtClean="0"/>
-              <a:t>8/12/18</a:t>
+              <a:t>8/19/18</a:t>
             </a:fld>
             <a:endParaRPr lang="en-US"/>
           </a:p>
@@ -2048,7 +2054,7 @@
           <a:p>
             <a:fld id="{8B60302E-30E2-D841-94D8-D5B4ABBB1556}" type="datetimeFigureOut">
               <a:rPr lang="en-US" smtClean="0"/>
-              <a:t>8/12/18</a:t>
+              <a:t>8/19/18</a:t>
             </a:fld>
             <a:endParaRPr lang="en-US"/>
           </a:p>
@@ -2300,7 +2306,7 @@
           <a:p>
             <a:fld id="{8B60302E-30E2-D841-94D8-D5B4ABBB1556}" type="datetimeFigureOut">
               <a:rPr lang="en-US" smtClean="0"/>
-              <a:t>8/12/18</a:t>
+              <a:t>8/19/18</a:t>
             </a:fld>
             <a:endParaRPr lang="en-US"/>
           </a:p>
@@ -2508,7 +2514,7 @@
           <a:p>
             <a:fld id="{8B60302E-30E2-D841-94D8-D5B4ABBB1556}" type="datetimeFigureOut">
               <a:rPr lang="en-US" smtClean="0"/>
-              <a:t>8/12/18</a:t>
+              <a:t>8/19/18</a:t>
             </a:fld>
             <a:endParaRPr lang="en-US"/>
           </a:p>
@@ -3996,6 +4002,197 @@
 </p:sld>
 </file>
 
+<file path=ppt/slides/slide4.xml><?xml version="1.0" encoding="utf-8"?>
+<p:sld xmlns:a="http://schemas.openxmlformats.org/drawingml/2006/main" xmlns:r="http://schemas.openxmlformats.org/officeDocument/2006/relationships" xmlns:p="http://schemas.openxmlformats.org/presentationml/2006/main">
+  <p:cSld>
+    <p:spTree>
+      <p:nvGrpSpPr>
+        <p:cNvPr id="1" name=""/>
+        <p:cNvGrpSpPr/>
+        <p:nvPr/>
+      </p:nvGrpSpPr>
+      <p:grpSpPr>
+        <a:xfrm>
+          <a:off x="0" y="0"/>
+          <a:ext cx="0" cy="0"/>
+          <a:chOff x="0" y="0"/>
+          <a:chExt cx="0" cy="0"/>
+        </a:xfrm>
+      </p:grpSpPr>
+      <p:sp>
+        <p:nvSpPr>
+          <p:cNvPr id="2" name="Title 1"/>
+          <p:cNvSpPr>
+            <a:spLocks noGrp="1"/>
+          </p:cNvSpPr>
+          <p:nvPr>
+            <p:ph type="title"/>
+          </p:nvPr>
+        </p:nvSpPr>
+        <p:spPr/>
+        <p:txBody>
+          <a:bodyPr/>
+          <a:lstStyle/>
+          <a:p>
+            <a:r>
+              <a:rPr lang="en-US" dirty="0" smtClean="0"/>
+              <a:t>19</a:t>
+            </a:r>
+            <a:r>
+              <a:rPr lang="en-US" baseline="30000" dirty="0" smtClean="0"/>
+              <a:t>th</a:t>
+            </a:r>
+            <a:r>
+              <a:rPr lang="en-US" dirty="0" smtClean="0"/>
+              <a:t> Aug 2018 DSUC Lab Practicals</a:t>
+            </a:r>
+            <a:endParaRPr lang="en-US" dirty="0"/>
+          </a:p>
+        </p:txBody>
+      </p:sp>
+      <p:sp>
+        <p:nvSpPr>
+          <p:cNvPr id="3" name="Content Placeholder 2"/>
+          <p:cNvSpPr>
+            <a:spLocks noGrp="1"/>
+          </p:cNvSpPr>
+          <p:nvPr>
+            <p:ph idx="1"/>
+          </p:nvPr>
+        </p:nvSpPr>
+        <p:spPr/>
+        <p:txBody>
+          <a:bodyPr>
+            <a:normAutofit fontScale="92500"/>
+          </a:bodyPr>
+          <a:lstStyle/>
+          <a:p>
+            <a:pPr marL="514350" indent="-514350" algn="just">
+              <a:buFont typeface="+mj-lt"/>
+              <a:buAutoNum type="arabicPeriod" startAt="9"/>
+            </a:pPr>
+            <a:r>
+              <a:rPr lang="en-US" dirty="0" smtClean="0"/>
+              <a:t>Write a program to represent sparse matrix using compact matrix notation.</a:t>
+            </a:r>
+          </a:p>
+          <a:p>
+            <a:pPr marL="514350" indent="-514350" algn="just">
+              <a:buFont typeface="+mj-lt"/>
+              <a:buAutoNum type="arabicPeriod" startAt="9"/>
+            </a:pPr>
+            <a:r>
+              <a:rPr lang="en-US" dirty="0" smtClean="0"/>
+              <a:t>WAP to verify the formula of address finding of 1D array learnt in class.</a:t>
+            </a:r>
+          </a:p>
+          <a:p>
+            <a:pPr marL="514350" indent="-514350" algn="just">
+              <a:buFont typeface="+mj-lt"/>
+              <a:buAutoNum type="arabicPeriod" startAt="9"/>
+            </a:pPr>
+            <a:r>
+              <a:rPr lang="en-US" dirty="0"/>
+              <a:t>WAP to verify the formula of address finding of </a:t>
+            </a:r>
+            <a:r>
+              <a:rPr lang="en-US" dirty="0" smtClean="0"/>
+              <a:t>2D array/matrix </a:t>
+            </a:r>
+            <a:r>
+              <a:rPr lang="en-US" dirty="0"/>
+              <a:t>learnt in class</a:t>
+            </a:r>
+            <a:r>
+              <a:rPr lang="en-US" dirty="0" smtClean="0"/>
+              <a:t>. </a:t>
+            </a:r>
+            <a:r>
+              <a:rPr lang="en-US" i="1" dirty="0" smtClean="0">
+                <a:solidFill>
+                  <a:schemeClr val="accent1"/>
+                </a:solidFill>
+              </a:rPr>
+              <a:t>(Note: In C programming 2D arrays are stored in </a:t>
+            </a:r>
+            <a:r>
+              <a:rPr lang="en-US" b="1" i="1" dirty="0" smtClean="0">
+                <a:solidFill>
+                  <a:schemeClr val="accent1"/>
+                </a:solidFill>
+              </a:rPr>
+              <a:t>row major </a:t>
+            </a:r>
+            <a:r>
+              <a:rPr lang="en-US" i="1" dirty="0" smtClean="0">
+                <a:solidFill>
+                  <a:schemeClr val="accent1"/>
+                </a:solidFill>
+              </a:rPr>
+              <a:t>form)</a:t>
+            </a:r>
+          </a:p>
+          <a:p>
+            <a:pPr marL="514350" indent="-514350" algn="just">
+              <a:buFont typeface="+mj-lt"/>
+              <a:buAutoNum type="arabicPeriod" startAt="9"/>
+            </a:pPr>
+            <a:endParaRPr lang="en-US" dirty="0" smtClean="0"/>
+          </a:p>
+          <a:p>
+            <a:pPr marL="0" indent="0" algn="just">
+              <a:buNone/>
+            </a:pPr>
+            <a:r>
+              <a:rPr lang="en-US" b="1" dirty="0" smtClean="0">
+                <a:solidFill>
+                  <a:schemeClr val="accent6">
+                    <a:lumMod val="75000"/>
+                  </a:schemeClr>
+                </a:solidFill>
+              </a:rPr>
+              <a:t>Hint</a:t>
+            </a:r>
+            <a:r>
+              <a:rPr lang="en-US" dirty="0" smtClean="0">
+                <a:solidFill>
+                  <a:schemeClr val="accent6">
+                    <a:lumMod val="75000"/>
+                  </a:schemeClr>
+                </a:solidFill>
+              </a:rPr>
+              <a:t>: for practical 10 and 11 use </a:t>
+            </a:r>
+            <a:r>
+              <a:rPr lang="en-US" b="1" dirty="0" smtClean="0"/>
+              <a:t>%u</a:t>
+            </a:r>
+            <a:r>
+              <a:rPr lang="en-US" dirty="0" smtClean="0">
+                <a:solidFill>
+                  <a:schemeClr val="accent6">
+                    <a:lumMod val="75000"/>
+                  </a:schemeClr>
+                </a:solidFill>
+              </a:rPr>
+              <a:t> format specifier to display address of an element of array</a:t>
+            </a:r>
+          </a:p>
+        </p:txBody>
+      </p:sp>
+    </p:spTree>
+    <p:extLst>
+      <p:ext uri="{BB962C8B-B14F-4D97-AF65-F5344CB8AC3E}">
+        <p14:creationId xmlns:p14="http://schemas.microsoft.com/office/powerpoint/2010/main" val="507815758"/>
+      </p:ext>
+    </p:extLst>
+  </p:cSld>
+  <p:clrMapOvr>
+    <a:masterClrMapping/>
+  </p:clrMapOvr>
+</p:sld>
+</file>
+
 <file path=ppt/theme/theme1.xml><?xml version="1.0" encoding="utf-8"?>
 <a:theme xmlns:a="http://schemas.openxmlformats.org/drawingml/2006/main" name="Office Theme">
   <a:themeElements>

</xml_diff>

<commit_message>
Updating practical list and adding practical 16
</commit_message>
<xml_diff>
--- a/lab practicals.pptx
+++ b/lab practicals.pptx
@@ -4579,11 +4579,7 @@
             </a:r>
             <a:r>
               <a:rPr lang="en-US" dirty="0" smtClean="0"/>
-              <a:t> </a:t>
-            </a:r>
-            <a:r>
-              <a:rPr lang="en-US" dirty="0" smtClean="0"/>
-              <a:t>Sep 2018 DSUC Lab Practicals</a:t>
+              <a:t> Sep 2018 DSUC Lab Practicals</a:t>
             </a:r>
             <a:endParaRPr lang="en-US" dirty="0"/>
           </a:p>
@@ -4613,7 +4609,7 @@
           <a:p>
             <a:pPr marL="514350" indent="-514350" algn="just">
               <a:buFont typeface="+mj-lt"/>
-              <a:buAutoNum type="arabicPeriod" startAt="15"/>
+              <a:buAutoNum type="arabicPeriod" startAt="16"/>
             </a:pPr>
             <a:r>
               <a:rPr lang="en-US" dirty="0" smtClean="0"/>
@@ -4621,11 +4617,7 @@
             </a:r>
             <a:r>
               <a:rPr lang="en-US" b="1" dirty="0" smtClean="0"/>
-              <a:t>doubly linked </a:t>
-            </a:r>
-            <a:r>
-              <a:rPr lang="en-US" b="1" dirty="0" smtClean="0"/>
-              <a:t>list</a:t>
+              <a:t>doubly linked list</a:t>
             </a:r>
             <a:r>
               <a:rPr lang="en-US" dirty="0" smtClean="0"/>
@@ -4663,42 +4655,22 @@
             </a:r>
           </a:p>
           <a:p>
-            <a:pPr marL="971550" lvl="1" indent="-514350" algn="just">
-              <a:buFont typeface="+mj-lt"/>
-              <a:buAutoNum type="alphaLcPeriod"/>
+            <a:pPr marL="0" indent="0" algn="just">
+              <a:buNone/>
             </a:pPr>
+            <a:endParaRPr lang="en-US" dirty="0" smtClean="0"/>
+          </a:p>
+          <a:p>
+            <a:pPr marL="0" indent="0" algn="just">
+              <a:buNone/>
+            </a:pPr>
             <a:r>
               <a:rPr lang="en-US" dirty="0" smtClean="0"/>
-              <a:t>Deletion at beginning</a:t>
-            </a:r>
-          </a:p>
-          <a:p>
-            <a:pPr marL="971550" lvl="1" indent="-514350" algn="just">
-              <a:buFont typeface="+mj-lt"/>
-              <a:buAutoNum type="alphaLcPeriod"/>
-            </a:pPr>
+              <a:t>After </a:t>
+            </a:r>
             <a:r>
               <a:rPr lang="en-US" dirty="0" smtClean="0"/>
-              <a:t>Deletion at end</a:t>
-            </a:r>
-          </a:p>
-          <a:p>
-            <a:pPr marL="971550" lvl="1" indent="-514350" algn="just">
-              <a:buFont typeface="+mj-lt"/>
-              <a:buAutoNum type="alphaLcPeriod"/>
-            </a:pPr>
-            <a:r>
-              <a:rPr lang="en-US" dirty="0" smtClean="0"/>
-              <a:t>Deletion at given position</a:t>
-            </a:r>
-          </a:p>
-          <a:p>
-            <a:pPr marL="0" indent="0" algn="just">
-              <a:buNone/>
-            </a:pPr>
-            <a:r>
-              <a:rPr lang="en-US" dirty="0" smtClean="0"/>
-              <a:t>After each operation, display (traverse) the linked list. </a:t>
+              <a:t>each operation, display (traverse) the linked list. </a:t>
             </a:r>
           </a:p>
           <a:p>

</xml_diff>